<commit_message>
[2023.10.12] RMS - Summary 마감 이후 작성 시, pptx 생성 안됨 이슈
</commit_message>
<xml_diff>
--- a/src/main/webapp/WEB-INF/Files/2023-08/calendar08.pptx
+++ b/src/main/webapp/WEB-INF/Files/2023-08/calendar08.pptx
@@ -217,7 +217,7 @@
               <a:pPr lvl="0">
                 <a:defRPr/>
               </a:pPr>
-              <a:t>2023-08-03</a:t>
+              <a:t>2023-08-30</a:t>
             </a:fld>
             <a:endParaRPr lang="ko-KR" altLang="en-US"/>
           </a:p>
@@ -1422,7 +1422,7 @@
                 <a:buNone/>
                 <a:defRPr/>
               </a:pPr>
-              <a:t>2023-08-03</a:t>
+              <a:t>2023-08-30</a:t>
             </a:fld>
             <a:endParaRPr kumimoji="1" lang="ko-KR" altLang="en-US" sz="1200" b="0" i="0" baseline="0">
               <a:solidFill>
@@ -3815,7 +3815,7 @@
           <p:nvPr>
             <p:extLst>
               <p:ext uri="{D42A27DB-BD31-4B8C-83A1-F6EECF244321}">
-                <p14:modId xmlns:p14="http://schemas.microsoft.com/office/powerpoint/2010/main" val="2726859232"/>
+                <p14:modId xmlns:p14="http://schemas.microsoft.com/office/powerpoint/2010/main" val="808433143"/>
               </p:ext>
             </p:extLst>
           </p:nvPr>
@@ -4488,6 +4488,9 @@
                     <a:lstStyle/>
                     <a:p>
                       <a:endParaRPr lang="ko-KR" altLang="en-US" sz="900" dirty="0">
+                        <a:solidFill>
+                          <a:srgbClr val="FF0000"/>
+                        </a:solidFill>
                         <a:latin typeface="맑은 고딕" panose="020B0503020000020004" pitchFamily="50" charset="-127"/>
                         <a:ea typeface="맑은 고딕" panose="020B0503020000020004" pitchFamily="50" charset="-127"/>
                       </a:endParaRPr>
@@ -4824,7 +4827,7 @@
                       <a:r>
                         <a:rPr lang="en-US" altLang="ko-KR" sz="900" dirty="0" smtClean="0">
                           <a:solidFill>
-                            <a:srgbClr val="0070C0"/>
+                            <a:schemeClr val="accent2"/>
                           </a:solidFill>
                           <a:latin typeface="맑은 고딕" panose="020B0503020000020004" pitchFamily="50" charset="-127"/>
                           <a:ea typeface="맑은 고딕" panose="020B0503020000020004" pitchFamily="50" charset="-127"/>
@@ -4833,7 +4836,7 @@
                       </a:r>
                       <a:endParaRPr lang="ko-KR" altLang="en-US" sz="900" dirty="0">
                         <a:solidFill>
-                          <a:srgbClr val="0070C0"/>
+                          <a:schemeClr val="accent2"/>
                         </a:solidFill>
                         <a:latin typeface="맑은 고딕" panose="020B0503020000020004" pitchFamily="50" charset="-127"/>
                         <a:ea typeface="맑은 고딕" panose="020B0503020000020004" pitchFamily="50" charset="-127"/>
@@ -5249,7 +5252,7 @@
                       <a:r>
                         <a:rPr lang="en-US" altLang="ko-KR" sz="900" dirty="0" smtClean="0">
                           <a:solidFill>
-                            <a:srgbClr val="0070C0"/>
+                            <a:schemeClr val="accent2"/>
                           </a:solidFill>
                           <a:latin typeface="맑은 고딕" panose="020B0503020000020004" pitchFamily="50" charset="-127"/>
                           <a:ea typeface="맑은 고딕" panose="020B0503020000020004" pitchFamily="50" charset="-127"/>
@@ -5258,7 +5261,7 @@
                       </a:r>
                       <a:endParaRPr lang="ko-KR" altLang="en-US" sz="900" dirty="0">
                         <a:solidFill>
-                          <a:srgbClr val="0070C0"/>
+                          <a:schemeClr val="accent2"/>
                         </a:solidFill>
                         <a:latin typeface="맑은 고딕" panose="020B0503020000020004" pitchFamily="50" charset="-127"/>
                         <a:ea typeface="맑은 고딕" panose="020B0503020000020004" pitchFamily="50" charset="-127"/>
@@ -5383,49 +5386,12 @@
                     <a:p>
                       <a:r>
                         <a:rPr lang="en-US" altLang="ko-KR" sz="900" dirty="0" smtClean="0">
-                          <a:solidFill>
-                            <a:srgbClr val="FF0000"/>
-                          </a:solidFill>
                           <a:latin typeface="맑은 고딕" panose="020B0503020000020004" pitchFamily="50" charset="-127"/>
                           <a:ea typeface="맑은 고딕" panose="020B0503020000020004" pitchFamily="50" charset="-127"/>
                         </a:rPr>
                         <a:t>14</a:t>
                       </a:r>
-                    </a:p>
-                    <a:p>
-                      <a:endParaRPr lang="en-US" altLang="ko-KR" sz="900" dirty="0" smtClean="0">
-                        <a:solidFill>
-                          <a:srgbClr val="FF0000"/>
-                        </a:solidFill>
-                        <a:latin typeface="맑은 고딕" panose="020B0503020000020004" pitchFamily="50" charset="-127"/>
-                        <a:ea typeface="맑은 고딕" panose="020B0503020000020004" pitchFamily="50" charset="-127"/>
-                      </a:endParaRPr>
-                    </a:p>
-                    <a:p>
-                      <a:r>
-                        <a:rPr lang="en-US" altLang="ko-KR" sz="900" dirty="0" smtClean="0">
-                          <a:solidFill>
-                            <a:srgbClr val="FF0000"/>
-                          </a:solidFill>
-                          <a:latin typeface="맑은 고딕" panose="020B0503020000020004" pitchFamily="50" charset="-127"/>
-                          <a:ea typeface="맑은 고딕" panose="020B0503020000020004" pitchFamily="50" charset="-127"/>
-                        </a:rPr>
-                        <a:t>Off</a:t>
-                      </a:r>
-                      <a:r>
-                        <a:rPr lang="en-US" altLang="ko-KR" sz="900" baseline="0" dirty="0" smtClean="0">
-                          <a:solidFill>
-                            <a:srgbClr val="FF0000"/>
-                          </a:solidFill>
-                          <a:latin typeface="맑은 고딕" panose="020B0503020000020004" pitchFamily="50" charset="-127"/>
-                          <a:ea typeface="맑은 고딕" panose="020B0503020000020004" pitchFamily="50" charset="-127"/>
-                        </a:rPr>
-                        <a:t> Duty Day</a:t>
-                      </a:r>
                       <a:endParaRPr lang="ko-KR" altLang="en-US" sz="900" dirty="0">
-                        <a:solidFill>
-                          <a:srgbClr val="FF0000"/>
-                        </a:solidFill>
                         <a:latin typeface="맑은 고딕" panose="020B0503020000020004" pitchFamily="50" charset="-127"/>
                         <a:ea typeface="맑은 고딕" panose="020B0503020000020004" pitchFamily="50" charset="-127"/>
                       </a:endParaRPr>
@@ -5478,39 +5444,12 @@
                     <a:p>
                       <a:r>
                         <a:rPr lang="en-US" altLang="ko-KR" sz="900" dirty="0" smtClean="0">
-                          <a:solidFill>
-                            <a:srgbClr val="FF0000"/>
-                          </a:solidFill>
                           <a:latin typeface="맑은 고딕" panose="020B0503020000020004" pitchFamily="50" charset="-127"/>
                           <a:ea typeface="맑은 고딕" panose="020B0503020000020004" pitchFamily="50" charset="-127"/>
                         </a:rPr>
                         <a:t>15</a:t>
                       </a:r>
-                    </a:p>
-                    <a:p>
-                      <a:endParaRPr lang="en-US" altLang="ko-KR" sz="900" dirty="0" smtClean="0">
-                        <a:solidFill>
-                          <a:srgbClr val="FF0000"/>
-                        </a:solidFill>
-                        <a:latin typeface="맑은 고딕" panose="020B0503020000020004" pitchFamily="50" charset="-127"/>
-                        <a:ea typeface="맑은 고딕" panose="020B0503020000020004" pitchFamily="50" charset="-127"/>
-                      </a:endParaRPr>
-                    </a:p>
-                    <a:p>
-                      <a:r>
-                        <a:rPr lang="ko-KR" altLang="en-US" sz="900" dirty="0" smtClean="0">
-                          <a:solidFill>
-                            <a:srgbClr val="FF0000"/>
-                          </a:solidFill>
-                          <a:latin typeface="맑은 고딕" panose="020B0503020000020004" pitchFamily="50" charset="-127"/>
-                          <a:ea typeface="맑은 고딕" panose="020B0503020000020004" pitchFamily="50" charset="-127"/>
-                        </a:rPr>
-                        <a:t>광복절</a:t>
-                      </a:r>
                       <a:endParaRPr lang="ko-KR" altLang="en-US" sz="900" dirty="0">
-                        <a:solidFill>
-                          <a:srgbClr val="FF0000"/>
-                        </a:solidFill>
                         <a:latin typeface="맑은 고딕" panose="020B0503020000020004" pitchFamily="50" charset="-127"/>
                         <a:ea typeface="맑은 고딕" panose="020B0503020000020004" pitchFamily="50" charset="-127"/>
                       </a:endParaRPr>
@@ -5738,7 +5677,7 @@
                       <a:r>
                         <a:rPr lang="en-US" altLang="ko-KR" sz="900" dirty="0" smtClean="0">
                           <a:solidFill>
-                            <a:srgbClr val="0070C0"/>
+                            <a:schemeClr val="accent2"/>
                           </a:solidFill>
                           <a:latin typeface="맑은 고딕" panose="020B0503020000020004" pitchFamily="50" charset="-127"/>
                           <a:ea typeface="맑은 고딕" panose="020B0503020000020004" pitchFamily="50" charset="-127"/>
@@ -5747,7 +5686,7 @@
                       </a:r>
                       <a:endParaRPr lang="ko-KR" altLang="en-US" sz="900" dirty="0">
                         <a:solidFill>
-                          <a:srgbClr val="0070C0"/>
+                          <a:schemeClr val="accent2"/>
                         </a:solidFill>
                         <a:latin typeface="맑은 고딕" panose="020B0503020000020004" pitchFamily="50" charset="-127"/>
                         <a:ea typeface="맑은 고딕" panose="020B0503020000020004" pitchFamily="50" charset="-127"/>
@@ -6163,7 +6102,7 @@
                       <a:r>
                         <a:rPr lang="en-US" altLang="ko-KR" sz="900" dirty="0" smtClean="0">
                           <a:solidFill>
-                            <a:srgbClr val="0070C0"/>
+                            <a:schemeClr val="accent2"/>
                           </a:solidFill>
                           <a:latin typeface="맑은 고딕" panose="020B0503020000020004" pitchFamily="50" charset="-127"/>
                           <a:ea typeface="맑은 고딕" panose="020B0503020000020004" pitchFamily="50" charset="-127"/>
@@ -6172,7 +6111,7 @@
                       </a:r>
                       <a:endParaRPr lang="ko-KR" altLang="en-US" sz="900" dirty="0">
                         <a:solidFill>
-                          <a:srgbClr val="0070C0"/>
+                          <a:schemeClr val="accent2"/>
                         </a:solidFill>
                         <a:latin typeface="맑은 고딕" panose="020B0503020000020004" pitchFamily="50" charset="-127"/>
                         <a:ea typeface="맑은 고딕" panose="020B0503020000020004" pitchFamily="50" charset="-127"/>
@@ -6579,6 +6518,9 @@
                     <a:lstStyle/>
                     <a:p>
                       <a:endParaRPr lang="ko-KR" altLang="en-US" sz="900" dirty="0">
+                        <a:solidFill>
+                          <a:schemeClr val="accent2"/>
+                        </a:solidFill>
                         <a:latin typeface="맑은 고딕" panose="020B0503020000020004" pitchFamily="50" charset="-127"/>
                         <a:ea typeface="맑은 고딕" panose="020B0503020000020004" pitchFamily="50" charset="-127"/>
                       </a:endParaRPr>

</xml_diff>